<commit_message>
all correct data now
</commit_message>
<xml_diff>
--- a/papers/isca2015/figures/figures.pptx
+++ b/papers/isca2015/figures/figures.pptx
@@ -5,7 +5,7 @@
     <p:sldMasterId id="2147483648" r:id="rId1"/>
   </p:sldMasterIdLst>
   <p:notesMasterIdLst>
-    <p:notesMasterId r:id="rId20"/>
+    <p:notesMasterId r:id="rId21"/>
   </p:notesMasterIdLst>
   <p:sldIdLst>
     <p:sldId id="256" r:id="rId2"/>
@@ -26,6 +26,7 @@
     <p:sldId id="268" r:id="rId17"/>
     <p:sldId id="273" r:id="rId18"/>
     <p:sldId id="274" r:id="rId19"/>
+    <p:sldId id="275" r:id="rId20"/>
   </p:sldIdLst>
   <p:sldSz cx="9144000" cy="6858000" type="screen4x3"/>
   <p:notesSz cx="6858000" cy="9144000"/>
@@ -209,7 +210,7 @@
           <a:p>
             <a:fld id="{3781CDF2-C3AB-44F2-B5B0-D2D1AF2900FF}" type="datetimeFigureOut">
               <a:rPr lang="en-US" smtClean="0"/>
-              <a:t>11/24/2014</a:t>
+              <a:t>11/25/2014</a:t>
             </a:fld>
             <a:endParaRPr lang="en-US"/>
           </a:p>
@@ -747,7 +748,7 @@
           <a:p>
             <a:fld id="{6D8C4249-8B6C-44D7-8DAF-5565F7FE5420}" type="datetimeFigureOut">
               <a:rPr lang="en-US" smtClean="0"/>
-              <a:t>11/24/2014</a:t>
+              <a:t>11/25/2014</a:t>
             </a:fld>
             <a:endParaRPr lang="en-US"/>
           </a:p>
@@ -917,7 +918,7 @@
           <a:p>
             <a:fld id="{6D8C4249-8B6C-44D7-8DAF-5565F7FE5420}" type="datetimeFigureOut">
               <a:rPr lang="en-US" smtClean="0"/>
-              <a:t>11/24/2014</a:t>
+              <a:t>11/25/2014</a:t>
             </a:fld>
             <a:endParaRPr lang="en-US"/>
           </a:p>
@@ -1097,7 +1098,7 @@
           <a:p>
             <a:fld id="{6D8C4249-8B6C-44D7-8DAF-5565F7FE5420}" type="datetimeFigureOut">
               <a:rPr lang="en-US" smtClean="0"/>
-              <a:t>11/24/2014</a:t>
+              <a:t>11/25/2014</a:t>
             </a:fld>
             <a:endParaRPr lang="en-US"/>
           </a:p>
@@ -1267,7 +1268,7 @@
           <a:p>
             <a:fld id="{6D8C4249-8B6C-44D7-8DAF-5565F7FE5420}" type="datetimeFigureOut">
               <a:rPr lang="en-US" smtClean="0"/>
-              <a:t>11/24/2014</a:t>
+              <a:t>11/25/2014</a:t>
             </a:fld>
             <a:endParaRPr lang="en-US"/>
           </a:p>
@@ -1513,7 +1514,7 @@
           <a:p>
             <a:fld id="{6D8C4249-8B6C-44D7-8DAF-5565F7FE5420}" type="datetimeFigureOut">
               <a:rPr lang="en-US" smtClean="0"/>
-              <a:t>11/24/2014</a:t>
+              <a:t>11/25/2014</a:t>
             </a:fld>
             <a:endParaRPr lang="en-US"/>
           </a:p>
@@ -1801,7 +1802,7 @@
           <a:p>
             <a:fld id="{6D8C4249-8B6C-44D7-8DAF-5565F7FE5420}" type="datetimeFigureOut">
               <a:rPr lang="en-US" smtClean="0"/>
-              <a:t>11/24/2014</a:t>
+              <a:t>11/25/2014</a:t>
             </a:fld>
             <a:endParaRPr lang="en-US"/>
           </a:p>
@@ -2223,7 +2224,7 @@
           <a:p>
             <a:fld id="{6D8C4249-8B6C-44D7-8DAF-5565F7FE5420}" type="datetimeFigureOut">
               <a:rPr lang="en-US" smtClean="0"/>
-              <a:t>11/24/2014</a:t>
+              <a:t>11/25/2014</a:t>
             </a:fld>
             <a:endParaRPr lang="en-US"/>
           </a:p>
@@ -2341,7 +2342,7 @@
           <a:p>
             <a:fld id="{6D8C4249-8B6C-44D7-8DAF-5565F7FE5420}" type="datetimeFigureOut">
               <a:rPr lang="en-US" smtClean="0"/>
-              <a:t>11/24/2014</a:t>
+              <a:t>11/25/2014</a:t>
             </a:fld>
             <a:endParaRPr lang="en-US"/>
           </a:p>
@@ -2436,7 +2437,7 @@
           <a:p>
             <a:fld id="{6D8C4249-8B6C-44D7-8DAF-5565F7FE5420}" type="datetimeFigureOut">
               <a:rPr lang="en-US" smtClean="0"/>
-              <a:t>11/24/2014</a:t>
+              <a:t>11/25/2014</a:t>
             </a:fld>
             <a:endParaRPr lang="en-US"/>
           </a:p>
@@ -2713,7 +2714,7 @@
           <a:p>
             <a:fld id="{6D8C4249-8B6C-44D7-8DAF-5565F7FE5420}" type="datetimeFigureOut">
               <a:rPr lang="en-US" smtClean="0"/>
-              <a:t>11/24/2014</a:t>
+              <a:t>11/25/2014</a:t>
             </a:fld>
             <a:endParaRPr lang="en-US"/>
           </a:p>
@@ -2966,7 +2967,7 @@
           <a:p>
             <a:fld id="{6D8C4249-8B6C-44D7-8DAF-5565F7FE5420}" type="datetimeFigureOut">
               <a:rPr lang="en-US" smtClean="0"/>
-              <a:t>11/24/2014</a:t>
+              <a:t>11/25/2014</a:t>
             </a:fld>
             <a:endParaRPr lang="en-US"/>
           </a:p>
@@ -3179,7 +3180,7 @@
           <a:p>
             <a:fld id="{6D8C4249-8B6C-44D7-8DAF-5565F7FE5420}" type="datetimeFigureOut">
               <a:rPr lang="en-US" smtClean="0"/>
-              <a:t>11/24/2014</a:t>
+              <a:t>11/25/2014</a:t>
             </a:fld>
             <a:endParaRPr lang="en-US"/>
           </a:p>
@@ -18862,7 +18863,7 @@
         </p:nvSpPr>
         <p:spPr>
           <a:xfrm>
-            <a:off x="2001902" y="685800"/>
+            <a:off x="1989390" y="685800"/>
             <a:ext cx="1884298" cy="369332"/>
           </a:xfrm>
           <a:prstGeom prst="rect">
@@ -18879,6 +18880,88 @@
             <a:r>
               <a:rPr lang="en-US" dirty="0" smtClean="0"/>
               <a:t>: One 10Gbps Link</a:t>
+            </a:r>
+            <a:endParaRPr lang="en-US" dirty="0"/>
+          </a:p>
+        </p:txBody>
+      </p:sp>
+      <p:sp>
+        <p:nvSpPr>
+          <p:cNvPr id="46" name="Oval 45"/>
+          <p:cNvSpPr/>
+          <p:nvPr/>
+        </p:nvSpPr>
+        <p:spPr>
+          <a:xfrm>
+            <a:off x="1773302" y="435123"/>
+            <a:ext cx="228600" cy="240738"/>
+          </a:xfrm>
+          <a:prstGeom prst="ellipse">
+            <a:avLst/>
+          </a:prstGeom>
+          <a:solidFill>
+            <a:schemeClr val="bg1"/>
+          </a:solidFill>
+          <a:ln w="28575">
+            <a:solidFill>
+              <a:schemeClr val="tx1"/>
+            </a:solidFill>
+          </a:ln>
+        </p:spPr>
+        <p:style>
+          <a:lnRef idx="2">
+            <a:schemeClr val="accent1">
+              <a:shade val="50000"/>
+            </a:schemeClr>
+          </a:lnRef>
+          <a:fillRef idx="1">
+            <a:schemeClr val="accent1"/>
+          </a:fillRef>
+          <a:effectRef idx="0">
+            <a:schemeClr val="accent1"/>
+          </a:effectRef>
+          <a:fontRef idx="minor">
+            <a:schemeClr val="lt1"/>
+          </a:fontRef>
+        </p:style>
+        <p:txBody>
+          <a:bodyPr rtlCol="0" anchor="ctr"/>
+          <a:lstStyle/>
+          <a:p>
+            <a:pPr algn="ctr"/>
+            <a:endParaRPr lang="en-US"/>
+          </a:p>
+        </p:txBody>
+      </p:sp>
+      <p:sp>
+        <p:nvSpPr>
+          <p:cNvPr id="47" name="TextBox 46"/>
+          <p:cNvSpPr txBox="1"/>
+          <p:nvPr/>
+        </p:nvSpPr>
+        <p:spPr>
+          <a:xfrm>
+            <a:off x="1989390" y="357091"/>
+            <a:ext cx="1250663" cy="369332"/>
+          </a:xfrm>
+          <a:prstGeom prst="rect">
+            <a:avLst/>
+          </a:prstGeom>
+          <a:noFill/>
+        </p:spPr>
+        <p:txBody>
+          <a:bodyPr wrap="none" rtlCol="0">
+            <a:spAutoFit/>
+          </a:bodyPr>
+          <a:lstStyle/>
+          <a:p>
+            <a:r>
+              <a:rPr lang="en-US" dirty="0" smtClean="0"/>
+              <a:t>: One </a:t>
+            </a:r>
+            <a:r>
+              <a:rPr lang="en-US" dirty="0" smtClean="0"/>
+              <a:t>Node</a:t>
             </a:r>
             <a:endParaRPr lang="en-US" dirty="0"/>
           </a:p>
@@ -20078,6 +20161,313 @@
     <p:extLst>
       <p:ext uri="{BB962C8B-B14F-4D97-AF65-F5344CB8AC3E}">
         <p14:creationId xmlns:p14="http://schemas.microsoft.com/office/powerpoint/2010/main" val="3249398139"/>
+      </p:ext>
+    </p:extLst>
+  </p:cSld>
+  <p:clrMapOvr>
+    <a:masterClrMapping/>
+  </p:clrMapOvr>
+</p:sld>
+</file>
+
+<file path=ppt/slides/slide19.xml><?xml version="1.0" encoding="utf-8"?>
+<p:sld xmlns:a="http://schemas.openxmlformats.org/drawingml/2006/main" xmlns:r="http://schemas.openxmlformats.org/officeDocument/2006/relationships" xmlns:p="http://schemas.openxmlformats.org/presentationml/2006/main">
+  <p:cSld>
+    <p:spTree>
+      <p:nvGrpSpPr>
+        <p:cNvPr id="1" name=""/>
+        <p:cNvGrpSpPr/>
+        <p:nvPr/>
+      </p:nvGrpSpPr>
+      <p:grpSpPr>
+        <a:xfrm>
+          <a:off x="0" y="0"/>
+          <a:ext cx="0" cy="0"/>
+          <a:chOff x="0" y="0"/>
+          <a:chExt cx="0" cy="0"/>
+        </a:xfrm>
+      </p:grpSpPr>
+      <p:sp>
+        <p:nvSpPr>
+          <p:cNvPr id="4" name="Rectangle 3"/>
+          <p:cNvSpPr/>
+          <p:nvPr/>
+        </p:nvSpPr>
+        <p:spPr>
+          <a:xfrm>
+            <a:off x="2057400" y="4114800"/>
+            <a:ext cx="5334000" cy="762000"/>
+          </a:xfrm>
+          <a:prstGeom prst="rect">
+            <a:avLst/>
+          </a:prstGeom>
+          <a:noFill/>
+          <a:ln>
+            <a:solidFill>
+              <a:schemeClr val="tx1"/>
+            </a:solidFill>
+          </a:ln>
+        </p:spPr>
+        <p:style>
+          <a:lnRef idx="2">
+            <a:schemeClr val="accent1">
+              <a:shade val="50000"/>
+            </a:schemeClr>
+          </a:lnRef>
+          <a:fillRef idx="1">
+            <a:schemeClr val="accent1"/>
+          </a:fillRef>
+          <a:effectRef idx="0">
+            <a:schemeClr val="accent1"/>
+          </a:effectRef>
+          <a:fontRef idx="minor">
+            <a:schemeClr val="lt1"/>
+          </a:fontRef>
+        </p:style>
+        <p:txBody>
+          <a:bodyPr rtlCol="0" anchor="ctr"/>
+          <a:lstStyle/>
+          <a:p>
+            <a:pPr algn="ctr"/>
+            <a:r>
+              <a:rPr lang="en-US" sz="3200" dirty="0" smtClean="0">
+                <a:solidFill>
+                  <a:schemeClr val="tx1"/>
+                </a:solidFill>
+              </a:rPr>
+              <a:t>Motherboard</a:t>
+            </a:r>
+            <a:endParaRPr lang="en-US" sz="3200" dirty="0">
+              <a:solidFill>
+                <a:schemeClr val="tx1"/>
+              </a:solidFill>
+            </a:endParaRPr>
+          </a:p>
+        </p:txBody>
+      </p:sp>
+      <p:sp>
+        <p:nvSpPr>
+          <p:cNvPr id="6" name="Rectangle 5"/>
+          <p:cNvSpPr/>
+          <p:nvPr/>
+        </p:nvSpPr>
+        <p:spPr>
+          <a:xfrm>
+            <a:off x="2971800" y="2895600"/>
+            <a:ext cx="2895600" cy="762000"/>
+          </a:xfrm>
+          <a:prstGeom prst="rect">
+            <a:avLst/>
+          </a:prstGeom>
+          <a:noFill/>
+          <a:ln>
+            <a:solidFill>
+              <a:schemeClr val="tx1"/>
+            </a:solidFill>
+          </a:ln>
+        </p:spPr>
+        <p:style>
+          <a:lnRef idx="2">
+            <a:schemeClr val="accent1">
+              <a:shade val="50000"/>
+            </a:schemeClr>
+          </a:lnRef>
+          <a:fillRef idx="1">
+            <a:schemeClr val="accent1"/>
+          </a:fillRef>
+          <a:effectRef idx="0">
+            <a:schemeClr val="accent1"/>
+          </a:effectRef>
+          <a:fontRef idx="minor">
+            <a:schemeClr val="lt1"/>
+          </a:fontRef>
+        </p:style>
+        <p:txBody>
+          <a:bodyPr rtlCol="0" anchor="ctr"/>
+          <a:lstStyle/>
+          <a:p>
+            <a:pPr algn="ctr"/>
+            <a:r>
+              <a:rPr lang="en-US" sz="3200" dirty="0" smtClean="0">
+                <a:solidFill>
+                  <a:schemeClr val="tx1"/>
+                </a:solidFill>
+              </a:rPr>
+              <a:t>VC707</a:t>
+            </a:r>
+            <a:endParaRPr lang="en-US" sz="3200" dirty="0">
+              <a:solidFill>
+                <a:schemeClr val="tx1"/>
+              </a:solidFill>
+            </a:endParaRPr>
+          </a:p>
+        </p:txBody>
+      </p:sp>
+      <p:sp>
+        <p:nvSpPr>
+          <p:cNvPr id="7" name="Left-Up Arrow 6"/>
+          <p:cNvSpPr/>
+          <p:nvPr/>
+        </p:nvSpPr>
+        <p:spPr>
+          <a:xfrm rot="10800000">
+            <a:off x="1981200" y="3048000"/>
+            <a:ext cx="990600" cy="1066800"/>
+          </a:xfrm>
+          <a:prstGeom prst="leftUpArrow">
+            <a:avLst/>
+          </a:prstGeom>
+          <a:noFill/>
+          <a:ln>
+            <a:solidFill>
+              <a:schemeClr val="tx1"/>
+            </a:solidFill>
+          </a:ln>
+        </p:spPr>
+        <p:style>
+          <a:lnRef idx="2">
+            <a:schemeClr val="accent1">
+              <a:shade val="50000"/>
+            </a:schemeClr>
+          </a:lnRef>
+          <a:fillRef idx="1">
+            <a:schemeClr val="accent1"/>
+          </a:fillRef>
+          <a:effectRef idx="0">
+            <a:schemeClr val="accent1"/>
+          </a:effectRef>
+          <a:fontRef idx="minor">
+            <a:schemeClr val="lt1"/>
+          </a:fontRef>
+        </p:style>
+        <p:txBody>
+          <a:bodyPr rtlCol="0" anchor="ctr"/>
+          <a:lstStyle/>
+          <a:p>
+            <a:pPr algn="ctr"/>
+            <a:endParaRPr lang="en-US">
+              <a:solidFill>
+                <a:schemeClr val="tx1"/>
+              </a:solidFill>
+            </a:endParaRPr>
+          </a:p>
+        </p:txBody>
+      </p:sp>
+      <p:sp>
+        <p:nvSpPr>
+          <p:cNvPr id="8" name="Rectangle 7"/>
+          <p:cNvSpPr/>
+          <p:nvPr/>
+        </p:nvSpPr>
+        <p:spPr>
+          <a:xfrm>
+            <a:off x="4495800" y="1703070"/>
+            <a:ext cx="2895600" cy="762000"/>
+          </a:xfrm>
+          <a:prstGeom prst="rect">
+            <a:avLst/>
+          </a:prstGeom>
+          <a:noFill/>
+          <a:ln>
+            <a:solidFill>
+              <a:schemeClr val="tx1"/>
+            </a:solidFill>
+          </a:ln>
+        </p:spPr>
+        <p:style>
+          <a:lnRef idx="2">
+            <a:schemeClr val="accent1">
+              <a:shade val="50000"/>
+            </a:schemeClr>
+          </a:lnRef>
+          <a:fillRef idx="1">
+            <a:schemeClr val="accent1"/>
+          </a:fillRef>
+          <a:effectRef idx="0">
+            <a:schemeClr val="accent1"/>
+          </a:effectRef>
+          <a:fontRef idx="minor">
+            <a:schemeClr val="lt1"/>
+          </a:fontRef>
+        </p:style>
+        <p:txBody>
+          <a:bodyPr rtlCol="0" anchor="ctr"/>
+          <a:lstStyle/>
+          <a:p>
+            <a:pPr algn="ctr"/>
+            <a:r>
+              <a:rPr lang="en-US" sz="3200" dirty="0" smtClean="0">
+                <a:solidFill>
+                  <a:schemeClr val="tx1"/>
+                </a:solidFill>
+              </a:rPr>
+              <a:t>Flash Card</a:t>
+            </a:r>
+            <a:endParaRPr lang="en-US" sz="3200" dirty="0">
+              <a:solidFill>
+                <a:schemeClr val="tx1"/>
+              </a:solidFill>
+            </a:endParaRPr>
+          </a:p>
+        </p:txBody>
+      </p:sp>
+      <p:sp>
+        <p:nvSpPr>
+          <p:cNvPr id="9" name="Up-Down Arrow 8"/>
+          <p:cNvSpPr/>
+          <p:nvPr/>
+        </p:nvSpPr>
+        <p:spPr>
+          <a:xfrm>
+            <a:off x="5029200" y="2465070"/>
+            <a:ext cx="685800" cy="430530"/>
+          </a:xfrm>
+          <a:prstGeom prst="upDownArrow">
+            <a:avLst>
+              <a:gd name="adj1" fmla="val 50000"/>
+              <a:gd name="adj2" fmla="val 23451"/>
+            </a:avLst>
+          </a:prstGeom>
+          <a:noFill/>
+          <a:ln>
+            <a:solidFill>
+              <a:schemeClr val="tx1"/>
+            </a:solidFill>
+          </a:ln>
+        </p:spPr>
+        <p:style>
+          <a:lnRef idx="2">
+            <a:schemeClr val="accent1">
+              <a:shade val="50000"/>
+            </a:schemeClr>
+          </a:lnRef>
+          <a:fillRef idx="1">
+            <a:schemeClr val="accent1"/>
+          </a:fillRef>
+          <a:effectRef idx="0">
+            <a:schemeClr val="accent1"/>
+          </a:effectRef>
+          <a:fontRef idx="minor">
+            <a:schemeClr val="lt1"/>
+          </a:fontRef>
+        </p:style>
+        <p:txBody>
+          <a:bodyPr rtlCol="0" anchor="ctr"/>
+          <a:lstStyle/>
+          <a:p>
+            <a:pPr algn="ctr"/>
+            <a:endParaRPr lang="en-US">
+              <a:solidFill>
+                <a:schemeClr val="tx1"/>
+              </a:solidFill>
+            </a:endParaRPr>
+          </a:p>
+        </p:txBody>
+      </p:sp>
+    </p:spTree>
+    <p:extLst>
+      <p:ext uri="{BB962C8B-B14F-4D97-AF65-F5344CB8AC3E}">
+        <p14:creationId xmlns:p14="http://schemas.microsoft.com/office/powerpoint/2010/main" val="2626246210"/>
       </p:ext>
     </p:extLst>
   </p:cSld>
@@ -21388,11 +21778,7 @@
           <a:p>
             <a:r>
               <a:rPr lang="en-US" sz="1600" dirty="0" smtClean="0"/>
-              <a:t>Node </a:t>
-            </a:r>
-            <a:r>
-              <a:rPr lang="en-US" sz="1600" dirty="0" smtClean="0"/>
-              <a:t>2</a:t>
+              <a:t>Node 2</a:t>
             </a:r>
             <a:endParaRPr lang="en-US" sz="1600" dirty="0"/>
           </a:p>
@@ -21428,7 +21814,6 @@
               <a:rPr lang="en-US" sz="1600" dirty="0"/>
               <a:t>N</a:t>
             </a:r>
-            <a:endParaRPr lang="en-US" sz="1600" dirty="0"/>
           </a:p>
         </p:txBody>
       </p:sp>
@@ -21563,11 +21948,6 @@
               </a:rPr>
               <a:t>In-Storage Processor</a:t>
             </a:r>
-            <a:endParaRPr lang="en-US" dirty="0">
-              <a:solidFill>
-                <a:schemeClr val="tx1"/>
-              </a:solidFill>
-            </a:endParaRPr>
           </a:p>
         </p:txBody>
       </p:sp>
@@ -21623,11 +22003,6 @@
               </a:rPr>
               <a:t>Host Interface</a:t>
             </a:r>
-            <a:endParaRPr lang="en-US" dirty="0">
-              <a:solidFill>
-                <a:schemeClr val="tx1"/>
-              </a:solidFill>
-            </a:endParaRPr>
           </a:p>
         </p:txBody>
       </p:sp>
@@ -21683,11 +22058,6 @@
               </a:rPr>
               <a:t>Flash Interface</a:t>
             </a:r>
-            <a:endParaRPr lang="en-US" dirty="0">
-              <a:solidFill>
-                <a:schemeClr val="tx1"/>
-              </a:solidFill>
-            </a:endParaRPr>
           </a:p>
         </p:txBody>
       </p:sp>
@@ -21934,11 +22304,6 @@
               </a:rPr>
               <a:t>DRAM</a:t>
             </a:r>
-            <a:endParaRPr lang="en-US" dirty="0">
-              <a:solidFill>
-                <a:schemeClr val="tx1"/>
-              </a:solidFill>
-            </a:endParaRPr>
           </a:p>
         </p:txBody>
       </p:sp>
@@ -22424,11 +22789,6 @@
               </a:rPr>
               <a:t>In-Storage Processor</a:t>
             </a:r>
-            <a:endParaRPr lang="en-US" dirty="0">
-              <a:solidFill>
-                <a:schemeClr val="tx1"/>
-              </a:solidFill>
-            </a:endParaRPr>
           </a:p>
         </p:txBody>
       </p:sp>
@@ -22486,11 +22846,6 @@
               </a:rPr>
               <a:t>Host Interface</a:t>
             </a:r>
-            <a:endParaRPr lang="en-US" dirty="0">
-              <a:solidFill>
-                <a:schemeClr val="tx1"/>
-              </a:solidFill>
-            </a:endParaRPr>
           </a:p>
         </p:txBody>
       </p:sp>
@@ -22546,11 +22901,6 @@
               </a:rPr>
               <a:t>Flash Interface</a:t>
             </a:r>
-            <a:endParaRPr lang="en-US" dirty="0">
-              <a:solidFill>
-                <a:schemeClr val="tx1"/>
-              </a:solidFill>
-            </a:endParaRPr>
           </a:p>
         </p:txBody>
       </p:sp>
@@ -28274,15 +28624,7 @@
                     <a:schemeClr val="tx1"/>
                   </a:solidFill>
                 </a:rPr>
-                <a:t>Node </a:t>
-              </a:r>
-              <a:r>
-                <a:rPr lang="en-US" dirty="0" smtClean="0">
-                  <a:solidFill>
-                    <a:schemeClr val="tx1"/>
-                  </a:solidFill>
-                </a:rPr>
-                <a:t>N</a:t>
+                <a:t>Node N</a:t>
               </a:r>
               <a:endParaRPr lang="en-US" dirty="0">
                 <a:solidFill>

</xml_diff>